<commit_message>
SLIDES AGGIORNATE alla presentazione di oggi
</commit_message>
<xml_diff>
--- a/Santarossa_Slides.pptx
+++ b/Santarossa_Slides.pptx
@@ -19039,7 +19039,7 @@
           </a:bodyPr>
           <a:lstStyle/>
           <a:p>
-            <a:pPr marL="0" indent="0">
+            <a:pPr marL="114300" indent="0">
               <a:buNone/>
             </a:pPr>
             <a:r>
@@ -19150,34 +19150,83 @@
               <a:t>	</a:t>
             </a:r>
             <a:r>
-              <a:rPr lang="it-IT" sz="1100" b="0" dirty="0" err="1">
-                <a:solidFill>
-                  <a:srgbClr val="000000"/>
-                </a:solidFill>
-                <a:effectLst/>
-                <a:latin typeface="Consolas" panose="020B0609020204030204" pitchFamily="49" charset="0"/>
-              </a:rPr>
-              <a:t>id_swimmer</a:t>
-            </a:r>
-            <a:r>
-              <a:rPr lang="it-IT" sz="1100" b="0" dirty="0">
-                <a:solidFill>
-                  <a:srgbClr val="000000"/>
-                </a:solidFill>
-                <a:effectLst/>
-                <a:latin typeface="Consolas" panose="020B0609020204030204" pitchFamily="49" charset="0"/>
-              </a:rPr>
-              <a:t>: </a:t>
-            </a:r>
-            <a:r>
-              <a:rPr lang="it-IT" sz="1100" b="0" dirty="0" err="1">
-                <a:solidFill>
-                  <a:srgbClr val="000000"/>
+              <a:rPr lang="en-US" sz="1100" b="0" dirty="0" err="1">
+                <a:solidFill>
+                  <a:schemeClr val="tx1"/>
                 </a:solidFill>
                 <a:effectLst/>
                 <a:latin typeface="Consolas" panose="020B0609020204030204" pitchFamily="49" charset="0"/>
               </a:rPr>
               <a:t>idController.text.length</a:t>
+            </a:r>
+            <a:r>
+              <a:rPr lang="en-US" sz="1100" b="0" dirty="0">
+                <a:solidFill>
+                  <a:schemeClr val="tx1"/>
+                </a:solidFill>
+                <a:effectLst/>
+                <a:latin typeface="Consolas" panose="020B0609020204030204" pitchFamily="49" charset="0"/>
+              </a:rPr>
+              <a:t> &gt; 0</a:t>
+            </a:r>
+            <a:r>
+              <a:rPr lang="en-US" sz="1100" dirty="0">
+                <a:solidFill>
+                  <a:schemeClr val="tx1"/>
+                </a:solidFill>
+                <a:latin typeface="Consolas" panose="020B0609020204030204" pitchFamily="49" charset="0"/>
+              </a:rPr>
+              <a:t> </a:t>
+            </a:r>
+            <a:r>
+              <a:rPr lang="en-US" sz="1100" b="0" dirty="0">
+                <a:solidFill>
+                  <a:schemeClr val="tx1"/>
+                </a:solidFill>
+                <a:effectLst/>
+                <a:latin typeface="Consolas" panose="020B0609020204030204" pitchFamily="49" charset="0"/>
+              </a:rPr>
+              <a:t>? </a:t>
+            </a:r>
+            <a:r>
+              <a:rPr lang="en-US" sz="1100" b="0" dirty="0" err="1">
+                <a:solidFill>
+                  <a:schemeClr val="tx1"/>
+                </a:solidFill>
+                <a:effectLst/>
+                <a:latin typeface="Consolas" panose="020B0609020204030204" pitchFamily="49" charset="0"/>
+              </a:rPr>
+              <a:t>int.parse</a:t>
+            </a:r>
+            <a:r>
+              <a:rPr lang="en-US" sz="1100" b="0" dirty="0">
+                <a:solidFill>
+                  <a:schemeClr val="tx1"/>
+                </a:solidFill>
+                <a:effectLst/>
+                <a:latin typeface="Consolas" panose="020B0609020204030204" pitchFamily="49" charset="0"/>
+              </a:rPr>
+              <a:t>(</a:t>
+            </a:r>
+            <a:r>
+              <a:rPr lang="en-US" sz="1100" b="0" dirty="0" err="1">
+                <a:solidFill>
+                  <a:schemeClr val="tx1"/>
+                </a:solidFill>
+                <a:effectLst/>
+                <a:latin typeface="Consolas" panose="020B0609020204030204" pitchFamily="49" charset="0"/>
+              </a:rPr>
+              <a:t>idController.text</a:t>
+            </a:r>
+            <a:r>
+              <a:rPr lang="en-US" sz="1100" b="0" dirty="0">
+                <a:solidFill>
+                  <a:schemeClr val="tx1"/>
+                </a:solidFill>
+                <a:effectLst/>
+                <a:latin typeface="Consolas" panose="020B0609020204030204" pitchFamily="49" charset="0"/>
+              </a:rPr>
+              <a:t>) : null</a:t>
             </a:r>
             <a:br>
               <a:rPr lang="it-IT" sz="1100" dirty="0">
@@ -19359,6 +19408,16 @@
             <a:pPr marL="0" indent="0">
               <a:buNone/>
             </a:pPr>
+            <a:r>
+              <a:rPr lang="it-IT" sz="1100" b="0" dirty="0">
+                <a:solidFill>
+                  <a:srgbClr val="0000FF"/>
+                </a:solidFill>
+                <a:effectLst/>
+                <a:latin typeface="Consolas" panose="020B0609020204030204" pitchFamily="49" charset="0"/>
+              </a:rPr>
+              <a:t>  </a:t>
+            </a:r>
             <a:r>
               <a:rPr lang="it-IT" sz="1100" b="0" dirty="0" err="1">
                 <a:solidFill>

</xml_diff>